<commit_message>
Syllabus + Slides 4 edit
</commit_message>
<xml_diff>
--- a/slides-steve/Chapter 04.pptx
+++ b/slides-steve/Chapter 04.pptx
@@ -241,7 +241,7 @@
           <a:p>
             <a:fld id="{167174DB-C3DD-4444-B546-BA6BD7F48F16}" type="datetimeFigureOut">
               <a:rPr lang="en-US" smtClean="0"/>
-              <a:t>8/30/16</a:t>
+              <a:t>9/30/16</a:t>
             </a:fld>
             <a:endParaRPr lang="en-US"/>
           </a:p>
@@ -1292,7 +1292,7 @@
           <a:p>
             <a:fld id="{734D2A9D-63EA-9D4A-99E7-3FBA41635A7D}" type="datetimeFigureOut">
               <a:rPr lang="en-US" smtClean="0"/>
-              <a:t>8/30/16</a:t>
+              <a:t>9/30/16</a:t>
             </a:fld>
             <a:endParaRPr lang="en-US"/>
           </a:p>
@@ -1580,7 +1580,7 @@
           <a:p>
             <a:fld id="{734D2A9D-63EA-9D4A-99E7-3FBA41635A7D}" type="datetimeFigureOut">
               <a:rPr lang="en-US" smtClean="0"/>
-              <a:t>8/30/16</a:t>
+              <a:t>9/30/16</a:t>
             </a:fld>
             <a:endParaRPr lang="en-US"/>
           </a:p>
@@ -1698,7 +1698,7 @@
           <a:p>
             <a:fld id="{734D2A9D-63EA-9D4A-99E7-3FBA41635A7D}" type="datetimeFigureOut">
               <a:rPr lang="en-US" smtClean="0"/>
-              <a:t>8/30/16</a:t>
+              <a:t>9/30/16</a:t>
             </a:fld>
             <a:endParaRPr lang="en-US"/>
           </a:p>
@@ -1793,7 +1793,7 @@
           <a:p>
             <a:fld id="{734D2A9D-63EA-9D4A-99E7-3FBA41635A7D}" type="datetimeFigureOut">
               <a:rPr lang="en-US" smtClean="0"/>
-              <a:t>8/30/16</a:t>
+              <a:t>9/30/16</a:t>
             </a:fld>
             <a:endParaRPr lang="en-US"/>
           </a:p>
@@ -2035,7 +2035,7 @@
           <a:p>
             <a:fld id="{734D2A9D-63EA-9D4A-99E7-3FBA41635A7D}" type="datetimeFigureOut">
               <a:rPr lang="en-US" smtClean="0"/>
-              <a:t>8/30/16</a:t>
+              <a:t>9/30/16</a:t>
             </a:fld>
             <a:endParaRPr lang="en-US"/>
           </a:p>
@@ -2277,7 +2277,7 @@
           <a:p>
             <a:fld id="{734D2A9D-63EA-9D4A-99E7-3FBA41635A7D}" type="datetimeFigureOut">
               <a:rPr lang="en-US" smtClean="0"/>
-              <a:t>8/30/16</a:t>
+              <a:t>9/30/16</a:t>
             </a:fld>
             <a:endParaRPr lang="en-US"/>
           </a:p>
@@ -2773,15 +2773,7 @@
             </a:r>
             <a:r>
               <a:rPr lang="en-US" dirty="0" smtClean="0"/>
-              <a:t>sectors (sometimes </a:t>
-            </a:r>
-            <a:r>
-              <a:rPr lang="en-US" dirty="0" smtClean="0"/>
-              <a:t>blocks, typically </a:t>
-            </a:r>
-            <a:r>
-              <a:rPr lang="en-US" dirty="0" smtClean="0"/>
-              <a:t>512 bytes), </a:t>
+              <a:t>sectors (sometimes blocks)(typically 512 bytes), </a:t>
             </a:r>
             <a:r>
               <a:rPr lang="en-US" dirty="0"/>
@@ -2981,17 +2973,8 @@
           <a:p>
             <a:r>
               <a:rPr lang="en-US" dirty="0" smtClean="0"/>
-              <a:t>Form </a:t>
-            </a:r>
-            <a:r>
-              <a:rPr lang="en-US" dirty="0" smtClean="0"/>
-              <a:t>a </a:t>
-            </a:r>
-            <a:r>
-              <a:rPr lang="en-US" dirty="0" smtClean="0"/>
-              <a:t>tree rooted at the top-level directory</a:t>
-            </a:r>
-            <a:endParaRPr lang="en-US" dirty="0" smtClean="0"/>
+              <a:t>Forms a tree</a:t>
+            </a:r>
           </a:p>
           <a:p>
             <a:r>
@@ -3072,15 +3055,7 @@
           <a:p>
             <a:r>
               <a:rPr lang="en-US" dirty="0" smtClean="0"/>
-              <a:t>Can have </a:t>
-            </a:r>
-            <a:r>
-              <a:rPr lang="en-US" dirty="0" smtClean="0"/>
-              <a:t>a file </a:t>
-            </a:r>
-            <a:r>
-              <a:rPr lang="en-US" dirty="0" smtClean="0"/>
-              <a:t>in linear set of sectors</a:t>
+              <a:t>Can have file in linear set of sectors</a:t>
             </a:r>
           </a:p>
           <a:p>
@@ -3433,7 +3408,7 @@
           <a:p>
             <a:r>
               <a:rPr lang="en-US" dirty="0" smtClean="0"/>
-              <a:t>Li/Unix</a:t>
+              <a:t>Linux/Unix</a:t>
             </a:r>
             <a:endParaRPr lang="en-US" dirty="0"/>
           </a:p>
@@ -3542,7 +3517,7 @@
           <a:p>
             <a:r>
               <a:rPr lang="en-US" dirty="0" smtClean="0"/>
-              <a:t>Li/Unix</a:t>
+              <a:t>Linux/Unix</a:t>
             </a:r>
             <a:endParaRPr lang="en-US" dirty="0"/>
           </a:p>
@@ -4295,8 +4270,8 @@
               <a:t>Has a swap file or </a:t>
             </a:r>
             <a:r>
-              <a:rPr lang="en-US" dirty="0" smtClean="0"/>
-              <a:t>file system</a:t>
+              <a:rPr lang="en-US" dirty="0" err="1" smtClean="0"/>
+              <a:t>filesystem</a:t>
             </a:r>
             <a:endParaRPr lang="en-US" dirty="0" smtClean="0"/>
           </a:p>
@@ -4379,11 +4354,7 @@
           <a:p>
             <a:r>
               <a:rPr lang="en-US" dirty="0" smtClean="0"/>
-              <a:t>Virtual in the sense of not </a:t>
-            </a:r>
-            <a:r>
-              <a:rPr lang="en-US" dirty="0" smtClean="0"/>
-              <a:t>real (physical)</a:t>
+              <a:t>Virtual in the sense of not real</a:t>
             </a:r>
             <a:endParaRPr lang="en-US" dirty="0"/>
           </a:p>
@@ -4684,20 +4655,8 @@
             <a:pPr lvl="1"/>
             <a:r>
               <a:rPr lang="en-US" dirty="0" smtClean="0"/>
-              <a:t>CPU sends addresses and if in cache, memory reference “squashed</a:t>
-            </a:r>
-            <a:r>
-              <a:rPr lang="en-US" dirty="0" smtClean="0"/>
-              <a:t>”</a:t>
-            </a:r>
-          </a:p>
-          <a:p>
-            <a:pPr lvl="1"/>
-            <a:r>
-              <a:rPr lang="en-US" dirty="0" smtClean="0"/>
-              <a:t>Translation look-aside buffer (TLB)</a:t>
-            </a:r>
-            <a:endParaRPr lang="en-US" dirty="0" smtClean="0"/>
+              <a:t>CPU sends addresses and if in cache, memory reference “squashed”</a:t>
+            </a:r>
           </a:p>
           <a:p>
             <a:r>
@@ -4805,15 +4764,7 @@
             <a:pPr lvl="1"/>
             <a:r>
               <a:rPr lang="en-US" dirty="0" smtClean="0"/>
-              <a:t>Slows access as files </a:t>
-            </a:r>
-            <a:r>
-              <a:rPr lang="en-US" dirty="0" smtClean="0"/>
-              <a:t>become less </a:t>
-            </a:r>
-            <a:r>
-              <a:rPr lang="en-US" dirty="0" smtClean="0"/>
-              <a:t>contiguous</a:t>
+              <a:t>Slows access as files less contiguous</a:t>
             </a:r>
           </a:p>
           <a:p>
@@ -4914,12 +4865,12 @@
               <a:t>Some </a:t>
             </a:r>
             <a:r>
-              <a:rPr lang="en-US" dirty="0" smtClean="0"/>
-              <a:t>file system </a:t>
-            </a:r>
-            <a:r>
-              <a:rPr lang="en-US" dirty="0" smtClean="0"/>
-              <a:t>types less susceptible</a:t>
+              <a:rPr lang="en-US" dirty="0" err="1" smtClean="0"/>
+              <a:t>filesystem</a:t>
+            </a:r>
+            <a:r>
+              <a:rPr lang="en-US" dirty="0" smtClean="0"/>
+              <a:t> types less susceptible</a:t>
             </a:r>
           </a:p>
           <a:p>
@@ -4928,8 +4879,8 @@
               <a:t>Possible performance gain of 30 – 90% for highly fragmented </a:t>
             </a:r>
             <a:r>
-              <a:rPr lang="en-US" dirty="0" smtClean="0"/>
-              <a:t>file system</a:t>
+              <a:rPr lang="en-US" dirty="0" err="1" smtClean="0"/>
+              <a:t>filesystem</a:t>
             </a:r>
             <a:endParaRPr lang="en-US" dirty="0"/>
           </a:p>
@@ -5153,17 +5104,12 @@
             </a:r>
             <a:r>
               <a:rPr lang="en-US" dirty="0" smtClean="0"/>
-              <a:t>any byte </a:t>
-            </a:r>
-            <a:r>
-              <a:rPr lang="en-US" dirty="0" smtClean="0"/>
-              <a:t>as fast as </a:t>
-            </a:r>
-            <a:r>
-              <a:rPr lang="en-US" dirty="0" smtClean="0"/>
-              <a:t>any other in any order</a:t>
-            </a:r>
-            <a:endParaRPr lang="en-US" dirty="0" smtClean="0"/>
+              <a:t>a byte </a:t>
+            </a:r>
+            <a:r>
+              <a:rPr lang="en-US" dirty="0" smtClean="0"/>
+              <a:t>as fast as all the others</a:t>
+            </a:r>
           </a:p>
           <a:p>
             <a:pPr lvl="1"/>
@@ -5481,21 +5427,8 @@
           <a:p>
             <a:r>
               <a:rPr lang="en-US" dirty="0" smtClean="0"/>
-              <a:t>Several </a:t>
-            </a:r>
-            <a:r>
-              <a:rPr lang="en-US" dirty="0" smtClean="0"/>
-              <a:t>passes with </a:t>
-            </a:r>
-            <a:r>
-              <a:rPr lang="en-US" dirty="0" smtClean="0"/>
-              <a:t>different </a:t>
-            </a:r>
-            <a:r>
-              <a:rPr lang="en-US" dirty="0" smtClean="0"/>
-              <a:t>data patterns</a:t>
-            </a:r>
-            <a:endParaRPr lang="en-US" dirty="0" smtClean="0"/>
+              <a:t>Several passes of different patterns</a:t>
+            </a:r>
           </a:p>
           <a:p>
             <a:endParaRPr lang="en-US" dirty="0"/>
@@ -5797,13 +5730,8 @@
             <a:pPr lvl="1"/>
             <a:r>
               <a:rPr lang="en-US" dirty="0" smtClean="0"/>
-              <a:t>Holds the instructions that are executed before an OS is </a:t>
-            </a:r>
-            <a:r>
-              <a:rPr lang="en-US" dirty="0" smtClean="0"/>
-              <a:t>loaded</a:t>
-            </a:r>
-            <a:endParaRPr lang="en-US" dirty="0" smtClean="0"/>
+              <a:t>Holds the instructions that are executed before an OS is load</a:t>
+            </a:r>
           </a:p>
           <a:p>
             <a:pPr lvl="1"/>
@@ -6048,8 +5976,8 @@
               <a:t>Always RAID and </a:t>
             </a:r>
             <a:r>
-              <a:rPr lang="en-US" dirty="0" smtClean="0"/>
-              <a:t>backup</a:t>
+              <a:rPr lang="en-US" dirty="0" err="1" smtClean="0"/>
+              <a:t>backu</a:t>
             </a:r>
             <a:endParaRPr lang="en-US" dirty="0" smtClean="0"/>
           </a:p>
@@ -6271,15 +6199,7 @@
           <a:p>
             <a:r>
               <a:rPr lang="en-US" dirty="0" smtClean="0"/>
-              <a:t>All have a limited </a:t>
-            </a:r>
-            <a:r>
-              <a:rPr lang="en-US" dirty="0" smtClean="0"/>
-              <a:t>lifetime (usu. </a:t>
-            </a:r>
-            <a:r>
-              <a:rPr lang="en-US" dirty="0" smtClean="0"/>
-              <a:t>measured in read/write cycles)</a:t>
+              <a:t>All have a limited lifetime</a:t>
             </a:r>
             <a:endParaRPr lang="en-US" dirty="0"/>
           </a:p>

</xml_diff>

<commit_message>
Upto ch 14. Ruby3 due date.
</commit_message>
<xml_diff>
--- a/slides-steve/Chapter 04.pptx
+++ b/slides-steve/Chapter 04.pptx
@@ -241,7 +241,7 @@
           <a:p>
             <a:fld id="{167174DB-C3DD-4444-B546-BA6BD7F48F16}" type="datetimeFigureOut">
               <a:rPr lang="en-US" smtClean="0"/>
-              <a:t>9/30/16</a:t>
+              <a:t>10/26/16</a:t>
             </a:fld>
             <a:endParaRPr lang="en-US"/>
           </a:p>
@@ -1292,7 +1292,7 @@
           <a:p>
             <a:fld id="{734D2A9D-63EA-9D4A-99E7-3FBA41635A7D}" type="datetimeFigureOut">
               <a:rPr lang="en-US" smtClean="0"/>
-              <a:t>9/30/16</a:t>
+              <a:t>10/26/16</a:t>
             </a:fld>
             <a:endParaRPr lang="en-US"/>
           </a:p>
@@ -1580,7 +1580,7 @@
           <a:p>
             <a:fld id="{734D2A9D-63EA-9D4A-99E7-3FBA41635A7D}" type="datetimeFigureOut">
               <a:rPr lang="en-US" smtClean="0"/>
-              <a:t>9/30/16</a:t>
+              <a:t>10/26/16</a:t>
             </a:fld>
             <a:endParaRPr lang="en-US"/>
           </a:p>
@@ -1698,7 +1698,7 @@
           <a:p>
             <a:fld id="{734D2A9D-63EA-9D4A-99E7-3FBA41635A7D}" type="datetimeFigureOut">
               <a:rPr lang="en-US" smtClean="0"/>
-              <a:t>9/30/16</a:t>
+              <a:t>10/26/16</a:t>
             </a:fld>
             <a:endParaRPr lang="en-US"/>
           </a:p>
@@ -1793,7 +1793,7 @@
           <a:p>
             <a:fld id="{734D2A9D-63EA-9D4A-99E7-3FBA41635A7D}" type="datetimeFigureOut">
               <a:rPr lang="en-US" smtClean="0"/>
-              <a:t>9/30/16</a:t>
+              <a:t>10/26/16</a:t>
             </a:fld>
             <a:endParaRPr lang="en-US"/>
           </a:p>
@@ -2035,7 +2035,7 @@
           <a:p>
             <a:fld id="{734D2A9D-63EA-9D4A-99E7-3FBA41635A7D}" type="datetimeFigureOut">
               <a:rPr lang="en-US" smtClean="0"/>
-              <a:t>9/30/16</a:t>
+              <a:t>10/26/16</a:t>
             </a:fld>
             <a:endParaRPr lang="en-US"/>
           </a:p>
@@ -2277,7 +2277,7 @@
           <a:p>
             <a:fld id="{734D2A9D-63EA-9D4A-99E7-3FBA41635A7D}" type="datetimeFigureOut">
               <a:rPr lang="en-US" smtClean="0"/>
-              <a:t>9/30/16</a:t>
+              <a:t>10/26/16</a:t>
             </a:fld>
             <a:endParaRPr lang="en-US"/>
           </a:p>
@@ -5100,15 +5100,7 @@
             <a:pPr lvl="2"/>
             <a:r>
               <a:rPr lang="en-US" dirty="0" smtClean="0"/>
-              <a:t>Accessing </a:t>
-            </a:r>
-            <a:r>
-              <a:rPr lang="en-US" dirty="0" smtClean="0"/>
-              <a:t>a byte </a:t>
-            </a:r>
-            <a:r>
-              <a:rPr lang="en-US" dirty="0" smtClean="0"/>
-              <a:t>as fast as all the others</a:t>
+              <a:t>Accessing a byte as fast as all the others</a:t>
             </a:r>
           </a:p>
           <a:p>
@@ -5976,8 +5968,8 @@
               <a:t>Always RAID and </a:t>
             </a:r>
             <a:r>
-              <a:rPr lang="en-US" dirty="0" err="1" smtClean="0"/>
-              <a:t>backu</a:t>
+              <a:rPr lang="en-US" dirty="0" smtClean="0"/>
+              <a:t>backup</a:t>
             </a:r>
             <a:endParaRPr lang="en-US" dirty="0" smtClean="0"/>
           </a:p>

</xml_diff>